<commit_message>
Design issues discussed today are addressed
</commit_message>
<xml_diff>
--- a/docs/sprint2/archives/create-drip-activity-diagram.pptx
+++ b/docs/sprint2/archives/create-drip-activity-diagram.pptx
@@ -3059,7 +3059,7 @@
         </p:nvSpPr>
         <p:spPr>
           <a:xfrm>
-            <a:off x="885729" y="764704"/>
+            <a:off x="885729" y="2105664"/>
             <a:ext cx="432048" cy="432048"/>
           </a:xfrm>
           <a:prstGeom prst="ellipse">
@@ -3099,7 +3099,7 @@
         </p:nvSpPr>
         <p:spPr>
           <a:xfrm>
-            <a:off x="2569639" y="632887"/>
+            <a:off x="2569639" y="1973847"/>
             <a:ext cx="1944216" cy="720080"/>
           </a:xfrm>
           <a:prstGeom prst="flowChartAlternateProcess">
@@ -3135,62 +3135,13 @@
       </p:sp>
       <p:sp>
         <p:nvSpPr>
-          <p:cNvPr id="10" name="Flowchart: Alternate Process 9"/>
-          <p:cNvSpPr/>
-          <p:nvPr/>
-        </p:nvSpPr>
-        <p:spPr>
-          <a:xfrm>
-            <a:off x="5724128" y="3622783"/>
-            <a:ext cx="2381520" cy="923158"/>
-          </a:xfrm>
-          <a:prstGeom prst="flowChartAlternateProcess">
-            <a:avLst/>
-          </a:prstGeom>
-        </p:spPr>
-        <p:style>
-          <a:lnRef idx="2">
-            <a:schemeClr val="dk1"/>
-          </a:lnRef>
-          <a:fillRef idx="1">
-            <a:schemeClr val="lt1"/>
-          </a:fillRef>
-          <a:effectRef idx="0">
-            <a:schemeClr val="dk1"/>
-          </a:effectRef>
-          <a:fontRef idx="minor">
-            <a:schemeClr val="dk1"/>
-          </a:fontRef>
-        </p:style>
-        <p:txBody>
-          <a:bodyPr rtlCol="0" anchor="ctr"/>
-          <a:lstStyle/>
-          <a:p>
-            <a:pPr algn="ctr"/>
-            <a:r>
-              <a:rPr lang="en-US" dirty="0"/>
-              <a:t>Parsing the input to identify the bucket(s)</a:t>
-            </a:r>
-          </a:p>
-          <a:p>
-            <a:pPr algn="ctr"/>
-            <a:r>
-              <a:rPr lang="en-US" dirty="0"/>
-              <a:t>via hashtags</a:t>
-            </a:r>
-            <a:endParaRPr lang="en-IN" dirty="0"/>
-          </a:p>
-        </p:txBody>
-      </p:sp>
-      <p:sp>
-        <p:nvSpPr>
           <p:cNvPr id="12" name="Flowchart: Decision 11"/>
           <p:cNvSpPr/>
           <p:nvPr/>
         </p:nvSpPr>
         <p:spPr>
           <a:xfrm>
-            <a:off x="5768015" y="1731659"/>
+            <a:off x="5768015" y="3072619"/>
             <a:ext cx="2088232" cy="1402308"/>
           </a:xfrm>
           <a:prstGeom prst="flowChartDecision">
@@ -3232,7 +3183,7 @@
         </p:nvSpPr>
         <p:spPr>
           <a:xfrm>
-            <a:off x="5818784" y="620688"/>
+            <a:off x="5818784" y="1961648"/>
             <a:ext cx="1986694" cy="720080"/>
           </a:xfrm>
           <a:prstGeom prst="flowChartAlternateProcess">
@@ -3274,7 +3225,7 @@
         </p:nvSpPr>
         <p:spPr>
           <a:xfrm>
-            <a:off x="2569639" y="2081175"/>
+            <a:off x="2569639" y="3422135"/>
             <a:ext cx="1944216" cy="720080"/>
           </a:xfrm>
           <a:prstGeom prst="flowChartAlternateProcess">
@@ -3316,7 +3267,7 @@
         </p:nvCxnSpPr>
         <p:spPr>
           <a:xfrm>
-            <a:off x="1331640" y="992927"/>
+            <a:off x="1331640" y="2333887"/>
             <a:ext cx="1224136" cy="0"/>
           </a:xfrm>
           <a:prstGeom prst="straightConnector1">
@@ -3352,7 +3303,7 @@
         </p:nvCxnSpPr>
         <p:spPr>
           <a:xfrm flipV="1">
-            <a:off x="4513855" y="980728"/>
+            <a:off x="4513855" y="2321688"/>
             <a:ext cx="1304929" cy="0"/>
           </a:xfrm>
           <a:prstGeom prst="straightConnector1">
@@ -3385,7 +3336,7 @@
         </p:nvCxnSpPr>
         <p:spPr>
           <a:xfrm>
-            <a:off x="6804248" y="1352967"/>
+            <a:off x="6804248" y="2693927"/>
             <a:ext cx="0" cy="378692"/>
           </a:xfrm>
           <a:prstGeom prst="straightConnector1">
@@ -3420,7 +3371,7 @@
         </p:nvCxnSpPr>
         <p:spPr>
           <a:xfrm flipV="1">
-            <a:off x="4513855" y="2432813"/>
+            <a:off x="4513855" y="3773773"/>
             <a:ext cx="1210273" cy="0"/>
           </a:xfrm>
           <a:prstGeom prst="straightConnector1">
@@ -3462,7 +3413,7 @@
         </p:nvCxnSpPr>
         <p:spPr>
           <a:xfrm>
-            <a:off x="3541747" y="1352967"/>
+            <a:off x="3541747" y="2693927"/>
             <a:ext cx="0" cy="728208"/>
           </a:xfrm>
           <a:prstGeom prst="straightConnector1">
@@ -3496,41 +3447,8 @@
         </p:nvCxnSpPr>
         <p:spPr>
           <a:xfrm>
-            <a:off x="6813625" y="3140968"/>
+            <a:off x="6813625" y="4481928"/>
             <a:ext cx="0" cy="459240"/>
-          </a:xfrm>
-          <a:prstGeom prst="straightConnector1">
-            <a:avLst/>
-          </a:prstGeom>
-          <a:ln>
-            <a:tailEnd type="arrow"/>
-          </a:ln>
-        </p:spPr>
-        <p:style>
-          <a:lnRef idx="1">
-            <a:schemeClr val="dk1"/>
-          </a:lnRef>
-          <a:fillRef idx="0">
-            <a:schemeClr val="dk1"/>
-          </a:fillRef>
-          <a:effectRef idx="0">
-            <a:schemeClr val="dk1"/>
-          </a:effectRef>
-          <a:fontRef idx="minor">
-            <a:schemeClr val="tx1"/>
-          </a:fontRef>
-        </p:style>
-      </p:cxnSp>
-      <p:cxnSp>
-        <p:nvCxnSpPr>
-          <p:cNvPr id="29" name="Straight Arrow Connector 28"/>
-          <p:cNvCxnSpPr/>
-          <p:nvPr/>
-        </p:nvCxnSpPr>
-        <p:spPr>
-          <a:xfrm>
-            <a:off x="6812131" y="4555936"/>
-            <a:ext cx="0" cy="384946"/>
           </a:xfrm>
           <a:prstGeom prst="straightConnector1">
             <a:avLst/>
@@ -3715,7 +3633,7 @@
         </p:nvSpPr>
         <p:spPr>
           <a:xfrm>
-            <a:off x="7021766" y="3149937"/>
+            <a:off x="6820972" y="4474213"/>
             <a:ext cx="485518" cy="369332"/>
           </a:xfrm>
           <a:prstGeom prst="rect">
@@ -3744,7 +3662,7 @@
         </p:nvSpPr>
         <p:spPr>
           <a:xfrm>
-            <a:off x="4938532" y="2063481"/>
+            <a:off x="4963478" y="3401535"/>
             <a:ext cx="455574" cy="369332"/>
           </a:xfrm>
           <a:prstGeom prst="rect">
@@ -3773,7 +3691,7 @@
         </p:nvSpPr>
         <p:spPr>
           <a:xfrm>
-            <a:off x="2205174" y="6552"/>
+            <a:off x="2242929" y="599592"/>
             <a:ext cx="4603761" cy="523220"/>
           </a:xfrm>
           <a:prstGeom prst="rect">

</xml_diff>